<commit_message>
Update Template Final Presentation 2020 ASPE Student Challenge.pptx
</commit_message>
<xml_diff>
--- a/Template Final Presentation 2020 ASPE Student Challenge.pptx
+++ b/Template Final Presentation 2020 ASPE Student Challenge.pptx
@@ -11,7 +11,7 @@
     <p:sldId id="256" r:id="rId2"/>
     <p:sldId id="258" r:id="rId3"/>
     <p:sldId id="257" r:id="rId4"/>
-    <p:sldId id="259" r:id="rId5"/>
+    <p:sldId id="260" r:id="rId5"/>
   </p:sldIdLst>
   <p:sldSz cx="9144000" cy="5143500" type="screen16x9"/>
   <p:notesSz cx="6858000" cy="9144000"/>
@@ -1595,7 +1595,7 @@
           <a:p>
             <a:r>
               <a:rPr lang="de-DE" dirty="0"/>
-              <a:t>ASPE 2020 Annual Meeting – October 20-23, 2020</a:t>
+              <a:t>ASPE 2020 Annual Meeting – October 21, 2020</a:t>
             </a:r>
           </a:p>
         </p:txBody>
@@ -2245,7 +2245,7 @@
           <a:p>
             <a:r>
               <a:rPr lang="de-DE" dirty="0"/>
-              <a:t>ASPE 2020 Annual Meeting – October 20-23, 2020</a:t>
+              <a:t>ASPE 2020 Annual Meeting – October 21, 2020</a:t>
             </a:r>
           </a:p>
         </p:txBody>
@@ -3050,7 +3050,7 @@
           <a:p>
             <a:r>
               <a:rPr lang="de-DE" dirty="0"/>
-              <a:t>ASPE 2020 Annual Meeting – October 20-23, 2020</a:t>
+              <a:t>ASPE 2020 Annual Meeting – October 21, 2020</a:t>
             </a:r>
           </a:p>
         </p:txBody>
@@ -5186,7 +5186,7 @@
           <p:cNvPr id="2" name="Title 1">
             <a:extLst>
               <a:ext uri="{FF2B5EF4-FFF2-40B4-BE49-F238E27FC236}">
-                <a16:creationId xmlns:a16="http://schemas.microsoft.com/office/drawing/2014/main" id="{8B1B1B8E-6CD7-4584-A416-0672A8719145}"/>
+                <a16:creationId xmlns:a16="http://schemas.microsoft.com/office/drawing/2014/main" id="{5321D9D5-FCEC-4F9E-9147-E4C7929B0845}"/>
               </a:ext>
             </a:extLst>
           </p:cNvPr>
@@ -5211,7 +5211,7 @@
           <p:cNvPr id="3" name="Subtitle 2">
             <a:extLst>
               <a:ext uri="{FF2B5EF4-FFF2-40B4-BE49-F238E27FC236}">
-                <a16:creationId xmlns:a16="http://schemas.microsoft.com/office/drawing/2014/main" id="{33E51BE3-6ADA-44BC-8A40-51AD50D79F61}"/>
+                <a16:creationId xmlns:a16="http://schemas.microsoft.com/office/drawing/2014/main" id="{0166093E-3F7A-4A9B-A879-2158B8767021}"/>
               </a:ext>
             </a:extLst>
           </p:cNvPr>
@@ -5227,7 +5227,7 @@
           <a:bodyPr/>
           <a:lstStyle/>
           <a:p>
-            <a:endParaRPr lang="en-US" dirty="0"/>
+            <a:endParaRPr lang="en-US"/>
           </a:p>
         </p:txBody>
       </p:sp>
@@ -5236,7 +5236,7 @@
           <p:cNvPr id="4" name="Slide Number Placeholder 3">
             <a:extLst>
               <a:ext uri="{FF2B5EF4-FFF2-40B4-BE49-F238E27FC236}">
-                <a16:creationId xmlns:a16="http://schemas.microsoft.com/office/drawing/2014/main" id="{7948E980-8DA5-40EC-A112-59C66E2C7459}"/>
+                <a16:creationId xmlns:a16="http://schemas.microsoft.com/office/drawing/2014/main" id="{4460F81F-AEC1-4C1B-BF07-378DFAC44533}"/>
               </a:ext>
             </a:extLst>
           </p:cNvPr>
@@ -5274,7 +5274,7 @@
           <p:cNvPr id="5" name="Slide Number Placeholder 4">
             <a:extLst>
               <a:ext uri="{FF2B5EF4-FFF2-40B4-BE49-F238E27FC236}">
-                <a16:creationId xmlns:a16="http://schemas.microsoft.com/office/drawing/2014/main" id="{AF8A3838-50E9-4CE7-B384-36F5D5920D8C}"/>
+                <a16:creationId xmlns:a16="http://schemas.microsoft.com/office/drawing/2014/main" id="{90E170D3-145D-4D32-8021-EA80D4A0C555}"/>
               </a:ext>
             </a:extLst>
           </p:cNvPr>
@@ -5292,7 +5292,7 @@
           <a:p>
             <a:r>
               <a:rPr lang="de-DE"/>
-              <a:t>ASPE 2020 Annual Meeting – October 20-23, 2020</a:t>
+              <a:t>ASPE 2020 Annual Meeting – October 21, 2020</a:t>
             </a:r>
             <a:endParaRPr lang="de-DE" dirty="0"/>
           </a:p>
@@ -5301,7 +5301,7 @@
     </p:spTree>
     <p:extLst>
       <p:ext uri="{BB962C8B-B14F-4D97-AF65-F5344CB8AC3E}">
-        <p14:creationId xmlns:p14="http://schemas.microsoft.com/office/powerpoint/2010/main" val="1661770661"/>
+        <p14:creationId xmlns:p14="http://schemas.microsoft.com/office/powerpoint/2010/main" val="3936554655"/>
       </p:ext>
     </p:extLst>
   </p:cSld>

</xml_diff>